<commit_message>
-adjusted projects so they compile -added Colin Wilson's library for the NTService project to enable compiling it to be both a service and an application for easier debugging
</commit_message>
<xml_diff>
--- a/Docs/AutoUpdates.pptx
+++ b/Docs/AutoUpdates.pptx
@@ -111,6 +111,11 @@
       </a:defRPr>
     </a:lvl9pPr>
   </p:defaultTextStyle>
+  <p:extLst>
+    <p:ext uri="{EFAFB233-063F-42B5-8137-9DF3F51BA10A}">
+      <p15:sldGuideLst xmlns:p15="http://schemas.microsoft.com/office/powerpoint/2012/main"/>
+    </p:ext>
+  </p:extLst>
 </p:presentation>
 </file>
 
@@ -156,7 +161,7 @@
           </a:lstStyle>
           <a:p>
             <a:r>
-              <a:rPr lang="en-US" smtClean="0"/>
+              <a:rPr lang="en-US"/>
               <a:t>Click to edit Master title style</a:t>
             </a:r>
             <a:endParaRPr lang="en-CA"/>
@@ -221,7 +226,7 @@
           </a:lstStyle>
           <a:p>
             <a:r>
-              <a:rPr lang="en-US" smtClean="0"/>
+              <a:rPr lang="en-US"/>
               <a:t>Click to edit Master subtitle style</a:t>
             </a:r>
             <a:endParaRPr lang="en-CA"/>
@@ -245,7 +250,7 @@
           <a:p>
             <a:fld id="{12129C28-1195-48AB-9A58-3AC43127BEB9}" type="datetimeFigureOut">
               <a:rPr lang="en-CA" smtClean="0"/>
-              <a:t>2017-02-14</a:t>
+              <a:t>2021-01-10</a:t>
             </a:fld>
             <a:endParaRPr lang="en-CA"/>
           </a:p>
@@ -339,7 +344,7 @@
           <a:lstStyle/>
           <a:p>
             <a:r>
-              <a:rPr lang="en-US" smtClean="0"/>
+              <a:rPr lang="en-US"/>
               <a:t>Click to edit Master title style</a:t>
             </a:r>
             <a:endParaRPr lang="en-CA"/>
@@ -363,35 +368,35 @@
           <a:p>
             <a:pPr lvl="0"/>
             <a:r>
-              <a:rPr lang="en-US" smtClean="0"/>
+              <a:rPr lang="en-US"/>
               <a:t>Edit Master text styles</a:t>
             </a:r>
           </a:p>
           <a:p>
             <a:pPr lvl="1"/>
             <a:r>
-              <a:rPr lang="en-US" smtClean="0"/>
+              <a:rPr lang="en-US"/>
               <a:t>Second level</a:t>
             </a:r>
           </a:p>
           <a:p>
             <a:pPr lvl="2"/>
             <a:r>
-              <a:rPr lang="en-US" smtClean="0"/>
+              <a:rPr lang="en-US"/>
               <a:t>Third level</a:t>
             </a:r>
           </a:p>
           <a:p>
             <a:pPr lvl="3"/>
             <a:r>
-              <a:rPr lang="en-US" smtClean="0"/>
+              <a:rPr lang="en-US"/>
               <a:t>Fourth level</a:t>
             </a:r>
           </a:p>
           <a:p>
             <a:pPr lvl="4"/>
             <a:r>
-              <a:rPr lang="en-US" smtClean="0"/>
+              <a:rPr lang="en-US"/>
               <a:t>Fifth level</a:t>
             </a:r>
             <a:endParaRPr lang="en-CA"/>
@@ -415,7 +420,7 @@
           <a:p>
             <a:fld id="{12129C28-1195-48AB-9A58-3AC43127BEB9}" type="datetimeFigureOut">
               <a:rPr lang="en-CA" smtClean="0"/>
-              <a:t>2017-02-14</a:t>
+              <a:t>2021-01-10</a:t>
             </a:fld>
             <a:endParaRPr lang="en-CA"/>
           </a:p>
@@ -514,7 +519,7 @@
           <a:lstStyle/>
           <a:p>
             <a:r>
-              <a:rPr lang="en-US" smtClean="0"/>
+              <a:rPr lang="en-US"/>
               <a:t>Click to edit Master title style</a:t>
             </a:r>
             <a:endParaRPr lang="en-CA"/>
@@ -543,35 +548,35 @@
           <a:p>
             <a:pPr lvl="0"/>
             <a:r>
-              <a:rPr lang="en-US" smtClean="0"/>
+              <a:rPr lang="en-US"/>
               <a:t>Edit Master text styles</a:t>
             </a:r>
           </a:p>
           <a:p>
             <a:pPr lvl="1"/>
             <a:r>
-              <a:rPr lang="en-US" smtClean="0"/>
+              <a:rPr lang="en-US"/>
               <a:t>Second level</a:t>
             </a:r>
           </a:p>
           <a:p>
             <a:pPr lvl="2"/>
             <a:r>
-              <a:rPr lang="en-US" smtClean="0"/>
+              <a:rPr lang="en-US"/>
               <a:t>Third level</a:t>
             </a:r>
           </a:p>
           <a:p>
             <a:pPr lvl="3"/>
             <a:r>
-              <a:rPr lang="en-US" smtClean="0"/>
+              <a:rPr lang="en-US"/>
               <a:t>Fourth level</a:t>
             </a:r>
           </a:p>
           <a:p>
             <a:pPr lvl="4"/>
             <a:r>
-              <a:rPr lang="en-US" smtClean="0"/>
+              <a:rPr lang="en-US"/>
               <a:t>Fifth level</a:t>
             </a:r>
             <a:endParaRPr lang="en-CA"/>
@@ -595,7 +600,7 @@
           <a:p>
             <a:fld id="{12129C28-1195-48AB-9A58-3AC43127BEB9}" type="datetimeFigureOut">
               <a:rPr lang="en-CA" smtClean="0"/>
-              <a:t>2017-02-14</a:t>
+              <a:t>2021-01-10</a:t>
             </a:fld>
             <a:endParaRPr lang="en-CA"/>
           </a:p>
@@ -689,7 +694,7 @@
           <a:lstStyle/>
           <a:p>
             <a:r>
-              <a:rPr lang="en-US" smtClean="0"/>
+              <a:rPr lang="en-US"/>
               <a:t>Click to edit Master title style</a:t>
             </a:r>
             <a:endParaRPr lang="en-CA"/>
@@ -713,35 +718,35 @@
           <a:p>
             <a:pPr lvl="0"/>
             <a:r>
-              <a:rPr lang="en-US" smtClean="0"/>
+              <a:rPr lang="en-US"/>
               <a:t>Edit Master text styles</a:t>
             </a:r>
           </a:p>
           <a:p>
             <a:pPr lvl="1"/>
             <a:r>
-              <a:rPr lang="en-US" smtClean="0"/>
+              <a:rPr lang="en-US"/>
               <a:t>Second level</a:t>
             </a:r>
           </a:p>
           <a:p>
             <a:pPr lvl="2"/>
             <a:r>
-              <a:rPr lang="en-US" smtClean="0"/>
+              <a:rPr lang="en-US"/>
               <a:t>Third level</a:t>
             </a:r>
           </a:p>
           <a:p>
             <a:pPr lvl="3"/>
             <a:r>
-              <a:rPr lang="en-US" smtClean="0"/>
+              <a:rPr lang="en-US"/>
               <a:t>Fourth level</a:t>
             </a:r>
           </a:p>
           <a:p>
             <a:pPr lvl="4"/>
             <a:r>
-              <a:rPr lang="en-US" smtClean="0"/>
+              <a:rPr lang="en-US"/>
               <a:t>Fifth level</a:t>
             </a:r>
             <a:endParaRPr lang="en-CA"/>
@@ -765,7 +770,7 @@
           <a:p>
             <a:fld id="{12129C28-1195-48AB-9A58-3AC43127BEB9}" type="datetimeFigureOut">
               <a:rPr lang="en-CA" smtClean="0"/>
-              <a:t>2017-02-14</a:t>
+              <a:t>2021-01-10</a:t>
             </a:fld>
             <a:endParaRPr lang="en-CA"/>
           </a:p>
@@ -868,7 +873,7 @@
           </a:lstStyle>
           <a:p>
             <a:r>
-              <a:rPr lang="en-US" smtClean="0"/>
+              <a:rPr lang="en-US"/>
               <a:t>Click to edit Master title style</a:t>
             </a:r>
             <a:endParaRPr lang="en-CA"/>
@@ -988,7 +993,7 @@
           <a:p>
             <a:pPr lvl="0"/>
             <a:r>
-              <a:rPr lang="en-US" smtClean="0"/>
+              <a:rPr lang="en-US"/>
               <a:t>Edit Master text styles</a:t>
             </a:r>
           </a:p>
@@ -1011,7 +1016,7 @@
           <a:p>
             <a:fld id="{12129C28-1195-48AB-9A58-3AC43127BEB9}" type="datetimeFigureOut">
               <a:rPr lang="en-CA" smtClean="0"/>
-              <a:t>2017-02-14</a:t>
+              <a:t>2021-01-10</a:t>
             </a:fld>
             <a:endParaRPr lang="en-CA"/>
           </a:p>
@@ -1105,7 +1110,7 @@
           <a:lstStyle/>
           <a:p>
             <a:r>
-              <a:rPr lang="en-US" smtClean="0"/>
+              <a:rPr lang="en-US"/>
               <a:t>Click to edit Master title style</a:t>
             </a:r>
             <a:endParaRPr lang="en-CA"/>
@@ -1134,35 +1139,35 @@
           <a:p>
             <a:pPr lvl="0"/>
             <a:r>
-              <a:rPr lang="en-US" smtClean="0"/>
+              <a:rPr lang="en-US"/>
               <a:t>Edit Master text styles</a:t>
             </a:r>
           </a:p>
           <a:p>
             <a:pPr lvl="1"/>
             <a:r>
-              <a:rPr lang="en-US" smtClean="0"/>
+              <a:rPr lang="en-US"/>
               <a:t>Second level</a:t>
             </a:r>
           </a:p>
           <a:p>
             <a:pPr lvl="2"/>
             <a:r>
-              <a:rPr lang="en-US" smtClean="0"/>
+              <a:rPr lang="en-US"/>
               <a:t>Third level</a:t>
             </a:r>
           </a:p>
           <a:p>
             <a:pPr lvl="3"/>
             <a:r>
-              <a:rPr lang="en-US" smtClean="0"/>
+              <a:rPr lang="en-US"/>
               <a:t>Fourth level</a:t>
             </a:r>
           </a:p>
           <a:p>
             <a:pPr lvl="4"/>
             <a:r>
-              <a:rPr lang="en-US" smtClean="0"/>
+              <a:rPr lang="en-US"/>
               <a:t>Fifth level</a:t>
             </a:r>
             <a:endParaRPr lang="en-CA"/>
@@ -1191,35 +1196,35 @@
           <a:p>
             <a:pPr lvl="0"/>
             <a:r>
-              <a:rPr lang="en-US" smtClean="0"/>
+              <a:rPr lang="en-US"/>
               <a:t>Edit Master text styles</a:t>
             </a:r>
           </a:p>
           <a:p>
             <a:pPr lvl="1"/>
             <a:r>
-              <a:rPr lang="en-US" smtClean="0"/>
+              <a:rPr lang="en-US"/>
               <a:t>Second level</a:t>
             </a:r>
           </a:p>
           <a:p>
             <a:pPr lvl="2"/>
             <a:r>
-              <a:rPr lang="en-US" smtClean="0"/>
+              <a:rPr lang="en-US"/>
               <a:t>Third level</a:t>
             </a:r>
           </a:p>
           <a:p>
             <a:pPr lvl="3"/>
             <a:r>
-              <a:rPr lang="en-US" smtClean="0"/>
+              <a:rPr lang="en-US"/>
               <a:t>Fourth level</a:t>
             </a:r>
           </a:p>
           <a:p>
             <a:pPr lvl="4"/>
             <a:r>
-              <a:rPr lang="en-US" smtClean="0"/>
+              <a:rPr lang="en-US"/>
               <a:t>Fifth level</a:t>
             </a:r>
             <a:endParaRPr lang="en-CA"/>
@@ -1243,7 +1248,7 @@
           <a:p>
             <a:fld id="{12129C28-1195-48AB-9A58-3AC43127BEB9}" type="datetimeFigureOut">
               <a:rPr lang="en-CA" smtClean="0"/>
-              <a:t>2017-02-14</a:t>
+              <a:t>2021-01-10</a:t>
             </a:fld>
             <a:endParaRPr lang="en-CA"/>
           </a:p>
@@ -1342,7 +1347,7 @@
           <a:lstStyle/>
           <a:p>
             <a:r>
-              <a:rPr lang="en-US" smtClean="0"/>
+              <a:rPr lang="en-US"/>
               <a:t>Click to edit Master title style</a:t>
             </a:r>
             <a:endParaRPr lang="en-CA"/>
@@ -1408,7 +1413,7 @@
           <a:p>
             <a:pPr lvl="0"/>
             <a:r>
-              <a:rPr lang="en-US" smtClean="0"/>
+              <a:rPr lang="en-US"/>
               <a:t>Edit Master text styles</a:t>
             </a:r>
           </a:p>
@@ -1436,35 +1441,35 @@
           <a:p>
             <a:pPr lvl="0"/>
             <a:r>
-              <a:rPr lang="en-US" smtClean="0"/>
+              <a:rPr lang="en-US"/>
               <a:t>Edit Master text styles</a:t>
             </a:r>
           </a:p>
           <a:p>
             <a:pPr lvl="1"/>
             <a:r>
-              <a:rPr lang="en-US" smtClean="0"/>
+              <a:rPr lang="en-US"/>
               <a:t>Second level</a:t>
             </a:r>
           </a:p>
           <a:p>
             <a:pPr lvl="2"/>
             <a:r>
-              <a:rPr lang="en-US" smtClean="0"/>
+              <a:rPr lang="en-US"/>
               <a:t>Third level</a:t>
             </a:r>
           </a:p>
           <a:p>
             <a:pPr lvl="3"/>
             <a:r>
-              <a:rPr lang="en-US" smtClean="0"/>
+              <a:rPr lang="en-US"/>
               <a:t>Fourth level</a:t>
             </a:r>
           </a:p>
           <a:p>
             <a:pPr lvl="4"/>
             <a:r>
-              <a:rPr lang="en-US" smtClean="0"/>
+              <a:rPr lang="en-US"/>
               <a:t>Fifth level</a:t>
             </a:r>
             <a:endParaRPr lang="en-CA"/>
@@ -1530,7 +1535,7 @@
           <a:p>
             <a:pPr lvl="0"/>
             <a:r>
-              <a:rPr lang="en-US" smtClean="0"/>
+              <a:rPr lang="en-US"/>
               <a:t>Edit Master text styles</a:t>
             </a:r>
           </a:p>
@@ -1558,35 +1563,35 @@
           <a:p>
             <a:pPr lvl="0"/>
             <a:r>
-              <a:rPr lang="en-US" smtClean="0"/>
+              <a:rPr lang="en-US"/>
               <a:t>Edit Master text styles</a:t>
             </a:r>
           </a:p>
           <a:p>
             <a:pPr lvl="1"/>
             <a:r>
-              <a:rPr lang="en-US" smtClean="0"/>
+              <a:rPr lang="en-US"/>
               <a:t>Second level</a:t>
             </a:r>
           </a:p>
           <a:p>
             <a:pPr lvl="2"/>
             <a:r>
-              <a:rPr lang="en-US" smtClean="0"/>
+              <a:rPr lang="en-US"/>
               <a:t>Third level</a:t>
             </a:r>
           </a:p>
           <a:p>
             <a:pPr lvl="3"/>
             <a:r>
-              <a:rPr lang="en-US" smtClean="0"/>
+              <a:rPr lang="en-US"/>
               <a:t>Fourth level</a:t>
             </a:r>
           </a:p>
           <a:p>
             <a:pPr lvl="4"/>
             <a:r>
-              <a:rPr lang="en-US" smtClean="0"/>
+              <a:rPr lang="en-US"/>
               <a:t>Fifth level</a:t>
             </a:r>
             <a:endParaRPr lang="en-CA"/>
@@ -1610,7 +1615,7 @@
           <a:p>
             <a:fld id="{12129C28-1195-48AB-9A58-3AC43127BEB9}" type="datetimeFigureOut">
               <a:rPr lang="en-CA" smtClean="0"/>
-              <a:t>2017-02-14</a:t>
+              <a:t>2021-01-10</a:t>
             </a:fld>
             <a:endParaRPr lang="en-CA"/>
           </a:p>
@@ -1704,7 +1709,7 @@
           <a:lstStyle/>
           <a:p>
             <a:r>
-              <a:rPr lang="en-US" smtClean="0"/>
+              <a:rPr lang="en-US"/>
               <a:t>Click to edit Master title style</a:t>
             </a:r>
             <a:endParaRPr lang="en-CA"/>
@@ -1728,7 +1733,7 @@
           <a:p>
             <a:fld id="{12129C28-1195-48AB-9A58-3AC43127BEB9}" type="datetimeFigureOut">
               <a:rPr lang="en-CA" smtClean="0"/>
-              <a:t>2017-02-14</a:t>
+              <a:t>2021-01-10</a:t>
             </a:fld>
             <a:endParaRPr lang="en-CA"/>
           </a:p>
@@ -1823,7 +1828,7 @@
           <a:p>
             <a:fld id="{12129C28-1195-48AB-9A58-3AC43127BEB9}" type="datetimeFigureOut">
               <a:rPr lang="en-CA" smtClean="0"/>
-              <a:t>2017-02-14</a:t>
+              <a:t>2021-01-10</a:t>
             </a:fld>
             <a:endParaRPr lang="en-CA"/>
           </a:p>
@@ -1926,7 +1931,7 @@
           </a:lstStyle>
           <a:p>
             <a:r>
-              <a:rPr lang="en-US" smtClean="0"/>
+              <a:rPr lang="en-US"/>
               <a:t>Click to edit Master title style</a:t>
             </a:r>
             <a:endParaRPr lang="en-CA"/>
@@ -1983,35 +1988,35 @@
           <a:p>
             <a:pPr lvl="0"/>
             <a:r>
-              <a:rPr lang="en-US" smtClean="0"/>
+              <a:rPr lang="en-US"/>
               <a:t>Edit Master text styles</a:t>
             </a:r>
           </a:p>
           <a:p>
             <a:pPr lvl="1"/>
             <a:r>
-              <a:rPr lang="en-US" smtClean="0"/>
+              <a:rPr lang="en-US"/>
               <a:t>Second level</a:t>
             </a:r>
           </a:p>
           <a:p>
             <a:pPr lvl="2"/>
             <a:r>
-              <a:rPr lang="en-US" smtClean="0"/>
+              <a:rPr lang="en-US"/>
               <a:t>Third level</a:t>
             </a:r>
           </a:p>
           <a:p>
             <a:pPr lvl="3"/>
             <a:r>
-              <a:rPr lang="en-US" smtClean="0"/>
+              <a:rPr lang="en-US"/>
               <a:t>Fourth level</a:t>
             </a:r>
           </a:p>
           <a:p>
             <a:pPr lvl="4"/>
             <a:r>
-              <a:rPr lang="en-US" smtClean="0"/>
+              <a:rPr lang="en-US"/>
               <a:t>Fifth level</a:t>
             </a:r>
             <a:endParaRPr lang="en-CA"/>
@@ -2077,7 +2082,7 @@
           <a:p>
             <a:pPr lvl="0"/>
             <a:r>
-              <a:rPr lang="en-US" smtClean="0"/>
+              <a:rPr lang="en-US"/>
               <a:t>Edit Master text styles</a:t>
             </a:r>
           </a:p>
@@ -2100,7 +2105,7 @@
           <a:p>
             <a:fld id="{12129C28-1195-48AB-9A58-3AC43127BEB9}" type="datetimeFigureOut">
               <a:rPr lang="en-CA" smtClean="0"/>
-              <a:t>2017-02-14</a:t>
+              <a:t>2021-01-10</a:t>
             </a:fld>
             <a:endParaRPr lang="en-CA"/>
           </a:p>
@@ -2203,7 +2208,7 @@
           </a:lstStyle>
           <a:p>
             <a:r>
-              <a:rPr lang="en-US" smtClean="0"/>
+              <a:rPr lang="en-US"/>
               <a:t>Click to edit Master title style</a:t>
             </a:r>
             <a:endParaRPr lang="en-CA"/>
@@ -2330,7 +2335,7 @@
           <a:p>
             <a:pPr lvl="0"/>
             <a:r>
-              <a:rPr lang="en-US" smtClean="0"/>
+              <a:rPr lang="en-US"/>
               <a:t>Edit Master text styles</a:t>
             </a:r>
           </a:p>
@@ -2353,7 +2358,7 @@
           <a:p>
             <a:fld id="{12129C28-1195-48AB-9A58-3AC43127BEB9}" type="datetimeFigureOut">
               <a:rPr lang="en-CA" smtClean="0"/>
-              <a:t>2017-02-14</a:t>
+              <a:t>2021-01-10</a:t>
             </a:fld>
             <a:endParaRPr lang="en-CA"/>
           </a:p>
@@ -2462,7 +2467,7 @@
           <a:lstStyle/>
           <a:p>
             <a:r>
-              <a:rPr lang="en-US" smtClean="0"/>
+              <a:rPr lang="en-US"/>
               <a:t>Click to edit Master title style</a:t>
             </a:r>
             <a:endParaRPr lang="en-CA"/>
@@ -2496,35 +2501,35 @@
           <a:p>
             <a:pPr lvl="0"/>
             <a:r>
-              <a:rPr lang="en-US" smtClean="0"/>
+              <a:rPr lang="en-US"/>
               <a:t>Edit Master text styles</a:t>
             </a:r>
           </a:p>
           <a:p>
             <a:pPr lvl="1"/>
             <a:r>
-              <a:rPr lang="en-US" smtClean="0"/>
+              <a:rPr lang="en-US"/>
               <a:t>Second level</a:t>
             </a:r>
           </a:p>
           <a:p>
             <a:pPr lvl="2"/>
             <a:r>
-              <a:rPr lang="en-US" smtClean="0"/>
+              <a:rPr lang="en-US"/>
               <a:t>Third level</a:t>
             </a:r>
           </a:p>
           <a:p>
             <a:pPr lvl="3"/>
             <a:r>
-              <a:rPr lang="en-US" smtClean="0"/>
+              <a:rPr lang="en-US"/>
               <a:t>Fourth level</a:t>
             </a:r>
           </a:p>
           <a:p>
             <a:pPr lvl="4"/>
             <a:r>
-              <a:rPr lang="en-US" smtClean="0"/>
+              <a:rPr lang="en-US"/>
               <a:t>Fifth level</a:t>
             </a:r>
             <a:endParaRPr lang="en-CA"/>
@@ -2566,7 +2571,7 @@
           <a:p>
             <a:fld id="{12129C28-1195-48AB-9A58-3AC43127BEB9}" type="datetimeFigureOut">
               <a:rPr lang="en-CA" smtClean="0"/>
-              <a:t>2017-02-14</a:t>
+              <a:t>2021-01-10</a:t>
             </a:fld>
             <a:endParaRPr lang="en-CA"/>
           </a:p>
@@ -2987,7 +2992,7 @@
           <a:lstStyle/>
           <a:p>
             <a:r>
-              <a:rPr lang="en-CA" dirty="0" err="1" smtClean="0"/>
+              <a:rPr lang="en-CA" dirty="0" err="1"/>
               <a:t>AutoUpdates</a:t>
             </a:r>
             <a:endParaRPr lang="en-CA" dirty="0"/>
@@ -3010,16 +3015,15 @@
           <a:lstStyle/>
           <a:p>
             <a:r>
-              <a:rPr lang="en-CA" dirty="0" smtClean="0"/>
+              <a:rPr lang="en-CA" dirty="0"/>
               <a:t>Over the Internet</a:t>
             </a:r>
           </a:p>
           <a:p>
             <a:r>
-              <a:rPr lang="en-CA" sz="2800" dirty="0" smtClean="0"/>
+              <a:rPr lang="en-CA" sz="2800" dirty="0"/>
               <a:t>A Modern Deployment Mechanism</a:t>
             </a:r>
-            <a:endParaRPr lang="en-CA" sz="2800" dirty="0"/>
           </a:p>
         </p:txBody>
       </p:sp>
@@ -3069,10 +3073,9 @@
           <a:lstStyle/>
           <a:p>
             <a:r>
-              <a:rPr lang="en-CA" dirty="0" smtClean="0"/>
+              <a:rPr lang="en-CA" dirty="0"/>
               <a:t>Why Do We Need It?</a:t>
             </a:r>
-            <a:endParaRPr lang="en-CA" dirty="0"/>
           </a:p>
         </p:txBody>
       </p:sp>
@@ -3094,52 +3097,31 @@
         </p:spPr>
         <p:txBody>
           <a:bodyPr>
-            <a:normAutofit fontScale="77500" lnSpcReduction="20000"/>
+            <a:normAutofit fontScale="85000" lnSpcReduction="20000"/>
           </a:bodyPr>
           <a:lstStyle/>
           <a:p>
             <a:r>
-              <a:rPr lang="en-CA" dirty="0" smtClean="0"/>
-              <a:t>It’s common - customers </a:t>
-            </a:r>
-            <a:r>
-              <a:rPr lang="en-CA" dirty="0"/>
-              <a:t>have an expectation they can get updates quickly and easily</a:t>
-            </a:r>
-            <a:r>
-              <a:rPr lang="en-CA" dirty="0" smtClean="0"/>
-              <a:t>.  Everyone who has a smart phone uses it!</a:t>
-            </a:r>
-            <a:endParaRPr lang="en-CA" dirty="0"/>
-          </a:p>
-          <a:p>
-            <a:r>
-              <a:rPr lang="en-CA" dirty="0" smtClean="0"/>
-              <a:t>A visible </a:t>
-            </a:r>
-            <a:r>
-              <a:rPr lang="en-CA" dirty="0"/>
-              <a:t>expression of the client’s maintenance dollars at work</a:t>
-            </a:r>
-          </a:p>
-          <a:p>
-            <a:r>
-              <a:rPr lang="en-CA" dirty="0" smtClean="0"/>
-              <a:t>Enables timely </a:t>
-            </a:r>
-            <a:r>
-              <a:rPr lang="en-CA" dirty="0"/>
-              <a:t>delivery of bug fixes </a:t>
-            </a:r>
-          </a:p>
-          <a:p>
-            <a:r>
-              <a:rPr lang="en-CA" dirty="0" smtClean="0"/>
-              <a:t>Works </a:t>
-            </a:r>
-            <a:r>
-              <a:rPr lang="en-CA" dirty="0"/>
-              <a:t>through </a:t>
+              <a:rPr lang="en-CA" dirty="0"/>
+              <a:t>It’s common - customers have an expectation they can get updates quickly and easily.  Everyone who has a smart phone uses it!</a:t>
+            </a:r>
+          </a:p>
+          <a:p>
+            <a:r>
+              <a:rPr lang="en-CA" dirty="0"/>
+              <a:t>A visible expression of the client’s maintenance dollars at work</a:t>
+            </a:r>
+          </a:p>
+          <a:p>
+            <a:r>
+              <a:rPr lang="en-CA" dirty="0"/>
+              <a:t>Enables timely delivery of bug fixes </a:t>
+            </a:r>
+          </a:p>
+          <a:p>
+            <a:r>
+              <a:rPr lang="en-CA" dirty="0"/>
+              <a:t>Works through </a:t>
             </a:r>
             <a:r>
               <a:rPr lang="en-CA" dirty="0" err="1"/>
@@ -3152,47 +3134,20 @@
           </a:p>
           <a:p>
             <a:r>
-              <a:rPr lang="en-CA" dirty="0" smtClean="0"/>
-              <a:t>No need </a:t>
-            </a:r>
-            <a:r>
-              <a:rPr lang="en-CA" dirty="0"/>
-              <a:t>to update a static web page attached to CP in order to “publish” new updates internally for testing and use by DRAS</a:t>
-            </a:r>
-          </a:p>
-          <a:p>
-            <a:r>
-              <a:rPr lang="en-CA" dirty="0" smtClean="0"/>
-              <a:t>Optionally </a:t>
-            </a:r>
-            <a:r>
-              <a:rPr lang="en-CA" dirty="0"/>
-              <a:t>displays release notes to the user</a:t>
-            </a:r>
-          </a:p>
-          <a:p>
-            <a:r>
-              <a:rPr lang="en-CA" dirty="0" smtClean="0"/>
-              <a:t>Download </a:t>
-            </a:r>
-            <a:r>
-              <a:rPr lang="en-CA" dirty="0"/>
-              <a:t>sizes can be reduced to a bare minimum using Microsoft patching </a:t>
-            </a:r>
-            <a:r>
-              <a:rPr lang="en-CA" dirty="0" smtClean="0"/>
-              <a:t>libraries or compression</a:t>
-            </a:r>
-            <a:endParaRPr lang="en-CA" dirty="0"/>
-          </a:p>
-          <a:p>
-            <a:r>
-              <a:rPr lang="en-CA" dirty="0" smtClean="0"/>
-              <a:t>Reports </a:t>
-            </a:r>
-            <a:r>
-              <a:rPr lang="en-CA" dirty="0"/>
-              <a:t>software version when checking for updates so we always know who is using licenses and what versions they are running</a:t>
+              <a:rPr lang="en-CA" dirty="0"/>
+              <a:t>Optionally displays release notes to the user</a:t>
+            </a:r>
+          </a:p>
+          <a:p>
+            <a:r>
+              <a:rPr lang="en-CA" dirty="0"/>
+              <a:t>Download sizes can be reduced to a bare minimum using Microsoft patching libraries or compression</a:t>
+            </a:r>
+          </a:p>
+          <a:p>
+            <a:r>
+              <a:rPr lang="en-CA" dirty="0"/>
+              <a:t>Reports software version when checking for updates so we always know who is using licenses and what versions they are running</a:t>
             </a:r>
           </a:p>
           <a:p>
@@ -3276,10 +3231,9 @@
           <a:lstStyle/>
           <a:p>
             <a:r>
-              <a:rPr lang="en-CA" dirty="0" smtClean="0"/>
+              <a:rPr lang="en-CA" dirty="0"/>
               <a:t>Additional Benefits</a:t>
             </a:r>
-            <a:endParaRPr lang="en-CA" dirty="0"/>
           </a:p>
         </p:txBody>
       </p:sp>
@@ -3299,56 +3253,56 @@
           <a:lstStyle/>
           <a:p>
             <a:r>
-              <a:rPr lang="en-CA" dirty="0" smtClean="0"/>
+              <a:rPr lang="en-CA" dirty="0"/>
               <a:t>We know how many licenses are being used for each client and for what products</a:t>
             </a:r>
           </a:p>
           <a:p>
             <a:r>
-              <a:rPr lang="en-CA" dirty="0" smtClean="0"/>
+              <a:rPr lang="en-CA" dirty="0"/>
               <a:t>We can expire licenses for non-payment</a:t>
             </a:r>
           </a:p>
           <a:p>
             <a:r>
-              <a:rPr lang="en-CA" dirty="0" smtClean="0"/>
+              <a:rPr lang="en-CA" dirty="0"/>
               <a:t>We can limit any piracy/license violations</a:t>
             </a:r>
           </a:p>
           <a:p>
             <a:r>
-              <a:rPr lang="en-CA" dirty="0" smtClean="0"/>
+              <a:rPr lang="en-CA" dirty="0"/>
               <a:t>Easily create updates and monitor update progress</a:t>
             </a:r>
           </a:p>
           <a:p>
             <a:r>
-              <a:rPr lang="en-CA" dirty="0" smtClean="0"/>
+              <a:rPr lang="en-CA" dirty="0"/>
               <a:t>Flexible manifest driven installer like functionality:</a:t>
             </a:r>
           </a:p>
           <a:p>
             <a:pPr lvl="1"/>
             <a:r>
-              <a:rPr lang="en-CA" dirty="0" smtClean="0"/>
+              <a:rPr lang="en-CA" dirty="0"/>
               <a:t>Download and Run an installer or EXE silently</a:t>
             </a:r>
           </a:p>
           <a:p>
             <a:pPr lvl="1"/>
             <a:r>
-              <a:rPr lang="en-CA" dirty="0" smtClean="0"/>
+              <a:rPr lang="en-CA" dirty="0"/>
               <a:t>Patch files</a:t>
             </a:r>
           </a:p>
           <a:p>
             <a:pPr lvl="1"/>
             <a:r>
-              <a:rPr lang="en-CA" dirty="0" err="1" smtClean="0"/>
+              <a:rPr lang="en-CA" dirty="0" err="1"/>
               <a:t>Uncompress</a:t>
             </a:r>
             <a:r>
-              <a:rPr lang="en-CA" dirty="0" smtClean="0"/>
+              <a:rPr lang="en-CA" dirty="0"/>
               <a:t> file(s)</a:t>
             </a:r>
           </a:p>
@@ -3400,10 +3354,9 @@
           <a:lstStyle/>
           <a:p>
             <a:r>
-              <a:rPr lang="en-CA" dirty="0" smtClean="0"/>
+              <a:rPr lang="en-CA" dirty="0"/>
               <a:t>Challenges</a:t>
             </a:r>
-            <a:endParaRPr lang="en-CA" dirty="0"/>
           </a:p>
         </p:txBody>
       </p:sp>
@@ -3423,7 +3376,7 @@
           <a:lstStyle/>
           <a:p>
             <a:r>
-              <a:rPr lang="en-CA" dirty="0" smtClean="0"/>
+              <a:rPr lang="en-CA" dirty="0"/>
               <a:t>Database versioning </a:t>
             </a:r>
           </a:p>
@@ -3432,7 +3385,7 @@
               <a:buNone/>
             </a:pPr>
             <a:r>
-              <a:rPr lang="en-CA" dirty="0" smtClean="0"/>
+              <a:rPr lang="en-CA" dirty="0"/>
               <a:t>The framework must be able to apply database scripts OR prevent deployments requiring newer database versions</a:t>
             </a:r>
           </a:p>
@@ -3444,20 +3397,18 @@
           </a:p>
           <a:p>
             <a:r>
-              <a:rPr lang="en-CA" dirty="0" smtClean="0"/>
+              <a:rPr lang="en-CA" dirty="0"/>
               <a:t>Client UAT environments</a:t>
             </a:r>
-            <a:endParaRPr lang="en-CA" dirty="0"/>
           </a:p>
           <a:p>
             <a:pPr marL="0" indent="0">
               <a:buNone/>
             </a:pPr>
             <a:r>
-              <a:rPr lang="en-CA" dirty="0" smtClean="0"/>
+              <a:rPr lang="en-CA" dirty="0"/>
               <a:t>Clients will often test each release in a UAT environment and only deploy them after approval.</a:t>
             </a:r>
-            <a:endParaRPr lang="en-CA" dirty="0"/>
           </a:p>
         </p:txBody>
       </p:sp>
@@ -3507,10 +3458,9 @@
           <a:lstStyle/>
           <a:p>
             <a:r>
-              <a:rPr lang="en-CA" dirty="0" smtClean="0"/>
+              <a:rPr lang="en-CA" dirty="0"/>
               <a:t>The Good News</a:t>
             </a:r>
-            <a:endParaRPr lang="en-CA" dirty="0"/>
           </a:p>
         </p:txBody>
       </p:sp>
@@ -3530,7 +3480,7 @@
           <a:lstStyle/>
           <a:p>
             <a:r>
-              <a:rPr lang="en-CA" dirty="0" smtClean="0"/>
+              <a:rPr lang="en-CA" dirty="0"/>
               <a:t>Database versioning </a:t>
             </a:r>
           </a:p>
@@ -3539,7 +3489,7 @@
               <a:buNone/>
             </a:pPr>
             <a:r>
-              <a:rPr lang="en-CA" dirty="0" smtClean="0"/>
+              <a:rPr lang="en-CA" dirty="0"/>
               <a:t>Versioning can be handled we just need to decide which approach to take and test it</a:t>
             </a:r>
           </a:p>
@@ -3551,28 +3501,26 @@
           </a:p>
           <a:p>
             <a:r>
-              <a:rPr lang="en-CA" dirty="0" smtClean="0"/>
+              <a:rPr lang="en-CA" dirty="0"/>
               <a:t>Client UAT environments</a:t>
             </a:r>
-            <a:endParaRPr lang="en-CA" dirty="0"/>
           </a:p>
           <a:p>
             <a:pPr marL="0" indent="0">
               <a:buNone/>
             </a:pPr>
             <a:r>
-              <a:rPr lang="en-CA" dirty="0" smtClean="0"/>
+              <a:rPr lang="en-CA" dirty="0"/>
               <a:t>Clients can use the same </a:t>
             </a:r>
             <a:r>
-              <a:rPr lang="en-CA" dirty="0" err="1" smtClean="0"/>
+              <a:rPr lang="en-CA" dirty="0" err="1"/>
               <a:t>AutoUpdate</a:t>
             </a:r>
             <a:r>
-              <a:rPr lang="en-CA" dirty="0" smtClean="0"/>
+              <a:rPr lang="en-CA" dirty="0"/>
               <a:t> mechanism internally on their network to deploy releases that pass UAT</a:t>
             </a:r>
-            <a:endParaRPr lang="en-CA" dirty="0"/>
           </a:p>
         </p:txBody>
       </p:sp>
@@ -3622,137 +3570,135 @@
           <a:lstStyle/>
           <a:p>
             <a:r>
-              <a:rPr lang="en-CA" dirty="0" smtClean="0"/>
+              <a:rPr lang="en-CA" dirty="0"/>
               <a:t>The </a:t>
             </a:r>
             <a:r>
-              <a:rPr lang="en-CA" dirty="0" err="1" smtClean="0"/>
+              <a:rPr lang="en-CA" dirty="0" err="1"/>
               <a:t>AutoUpdate</a:t>
             </a:r>
             <a:r>
-              <a:rPr lang="en-CA" dirty="0" smtClean="0"/>
+              <a:rPr lang="en-CA" dirty="0"/>
               <a:t> Pieces </a:t>
             </a:r>
+          </a:p>
+        </p:txBody>
+      </p:sp>
+      <p:sp>
+        <p:nvSpPr>
+          <p:cNvPr id="3" name="Content Placeholder 2"/>
+          <p:cNvSpPr>
+            <a:spLocks noGrp="1"/>
+          </p:cNvSpPr>
+          <p:nvPr>
+            <p:ph idx="1"/>
+          </p:nvPr>
+        </p:nvSpPr>
+        <p:spPr/>
+        <p:txBody>
+          <a:bodyPr>
+            <a:normAutofit fontScale="92500" lnSpcReduction="20000"/>
+          </a:bodyPr>
+          <a:lstStyle/>
+          <a:p>
+            <a:r>
+              <a:rPr lang="en-CA" dirty="0" err="1"/>
+              <a:t>UpdateServer</a:t>
+            </a:r>
             <a:endParaRPr lang="en-CA" dirty="0"/>
           </a:p>
-        </p:txBody>
-      </p:sp>
-      <p:sp>
-        <p:nvSpPr>
-          <p:cNvPr id="3" name="Content Placeholder 2"/>
-          <p:cNvSpPr>
-            <a:spLocks noGrp="1"/>
-          </p:cNvSpPr>
-          <p:nvPr>
-            <p:ph idx="1"/>
-          </p:nvPr>
-        </p:nvSpPr>
-        <p:spPr/>
-        <p:txBody>
-          <a:bodyPr>
-            <a:normAutofit fontScale="85000" lnSpcReduction="10000"/>
-          </a:bodyPr>
-          <a:lstStyle/>
-          <a:p>
-            <a:r>
-              <a:rPr lang="en-CA" dirty="0" err="1" smtClean="0"/>
+          <a:p>
+            <a:pPr lvl="1"/>
+            <a:r>
+              <a:rPr lang="en-CA" dirty="0"/>
+              <a:t>A SOAP based Web Service that supplies the incremental updates</a:t>
+            </a:r>
+          </a:p>
+          <a:p>
+            <a:r>
+              <a:rPr lang="en-CA" dirty="0"/>
+              <a:t>Launcher</a:t>
+            </a:r>
+          </a:p>
+          <a:p>
+            <a:pPr lvl="1"/>
+            <a:r>
+              <a:rPr lang="en-CA" dirty="0"/>
+              <a:t>An application proxy that can be used to check for and apply updates (requires admin privileges) every time the application is launched</a:t>
+            </a:r>
+          </a:p>
+          <a:p>
+            <a:r>
+              <a:rPr lang="en-CA" dirty="0" err="1"/>
+              <a:t>ClientUpdateService</a:t>
+            </a:r>
+            <a:endParaRPr lang="en-CA" dirty="0"/>
+          </a:p>
+          <a:p>
+            <a:pPr lvl="1"/>
+            <a:r>
+              <a:rPr lang="en-CA" dirty="0"/>
+              <a:t>A Windows NT Service that downloads and can optionally apply updates (requires admin privileges)</a:t>
+            </a:r>
+          </a:p>
+          <a:p>
+            <a:r>
+              <a:rPr lang="en-CA" dirty="0" err="1"/>
+              <a:t>UpdateManager</a:t>
+            </a:r>
+            <a:endParaRPr lang="en-CA" dirty="0"/>
+          </a:p>
+          <a:p>
+            <a:pPr lvl="1"/>
+            <a:r>
+              <a:rPr lang="en-CA" dirty="0"/>
+              <a:t>A fully customizable application that creates an update manifest and copies it along with the updated files to a shared location accessible to the </a:t>
+            </a:r>
+            <a:r>
+              <a:rPr lang="en-CA" dirty="0" err="1"/>
               <a:t>UpdateServer</a:t>
             </a:r>
-            <a:endParaRPr lang="en-CA" dirty="0" smtClean="0"/>
+            <a:endParaRPr lang="en-CA" dirty="0"/>
+          </a:p>
+          <a:p>
+            <a:r>
+              <a:rPr lang="en-CA" dirty="0"/>
+              <a:t>Deployment database</a:t>
+            </a:r>
           </a:p>
           <a:p>
             <a:pPr lvl="1"/>
             <a:r>
-              <a:rPr lang="en-CA" dirty="0" smtClean="0"/>
-              <a:t>A SOAP based Web Service that supplies the incremental updates</a:t>
-            </a:r>
-          </a:p>
-          <a:p>
-            <a:r>
-              <a:rPr lang="en-CA" dirty="0" smtClean="0"/>
-              <a:t>Launcher</a:t>
-            </a:r>
-          </a:p>
-          <a:p>
-            <a:pPr lvl="1"/>
-            <a:r>
-              <a:rPr lang="en-CA" dirty="0" smtClean="0"/>
-              <a:t>An application proxy that can be used to check for and apply updates (requires admin privileges) every time the application is launched</a:t>
-            </a:r>
-          </a:p>
-          <a:p>
-            <a:r>
-              <a:rPr lang="en-CA" dirty="0" err="1" smtClean="0"/>
-              <a:t>ClientUpdateService</a:t>
-            </a:r>
-            <a:endParaRPr lang="en-CA" dirty="0" smtClean="0"/>
-          </a:p>
-          <a:p>
-            <a:pPr lvl="1"/>
-            <a:r>
-              <a:rPr lang="en-CA" dirty="0" smtClean="0"/>
-              <a:t>A Windows NT Service that downloads and can optionally apply updates </a:t>
-            </a:r>
-            <a:r>
-              <a:rPr lang="en-CA" dirty="0" smtClean="0"/>
-              <a:t>(requires admin privileges)</a:t>
-            </a:r>
-            <a:endParaRPr lang="en-CA" dirty="0" smtClean="0"/>
-          </a:p>
-          <a:p>
-            <a:r>
-              <a:rPr lang="en-CA" dirty="0" err="1" smtClean="0"/>
+              <a:rPr lang="en-CA" dirty="0"/>
+              <a:t>A SQL Server or </a:t>
+            </a:r>
+            <a:r>
+              <a:rPr lang="en-CA" dirty="0" err="1"/>
+              <a:t>FireBird</a:t>
+            </a:r>
+            <a:r>
+              <a:rPr lang="en-CA" dirty="0"/>
+              <a:t> database used by the </a:t>
+            </a:r>
+            <a:r>
+              <a:rPr lang="en-CA" dirty="0" err="1"/>
+              <a:t>UpdateServer</a:t>
+            </a:r>
+            <a:r>
+              <a:rPr lang="en-CA" dirty="0"/>
+              <a:t> and </a:t>
+            </a:r>
+            <a:r>
+              <a:rPr lang="en-CA" dirty="0" err="1"/>
               <a:t>UpdateManager</a:t>
             </a:r>
-            <a:endParaRPr lang="en-CA" dirty="0" smtClean="0"/>
-          </a:p>
-          <a:p>
-            <a:pPr lvl="1"/>
-            <a:r>
-              <a:rPr lang="en-CA" dirty="0" smtClean="0"/>
-              <a:t>A fully customizable application that creates an update manifest and copies it along with the updated files to a shared location accessible to the </a:t>
-            </a:r>
-            <a:r>
-              <a:rPr lang="en-CA" dirty="0" err="1" smtClean="0"/>
-              <a:t>UpdateServer</a:t>
-            </a:r>
-            <a:endParaRPr lang="en-CA" dirty="0" smtClean="0"/>
-          </a:p>
-          <a:p>
-            <a:r>
-              <a:rPr lang="en-CA" dirty="0" smtClean="0"/>
-              <a:t>Deployment database</a:t>
-            </a:r>
-          </a:p>
-          <a:p>
-            <a:pPr lvl="1"/>
-            <a:r>
-              <a:rPr lang="en-CA" dirty="0" smtClean="0"/>
-              <a:t>A SQL Server </a:t>
-            </a:r>
-            <a:r>
-              <a:rPr lang="en-CA" dirty="0" smtClean="0"/>
-              <a:t>shared information store used by the </a:t>
-            </a:r>
-            <a:r>
-              <a:rPr lang="en-CA" dirty="0" err="1" smtClean="0"/>
-              <a:t>UpdateServer</a:t>
-            </a:r>
-            <a:r>
-              <a:rPr lang="en-CA" dirty="0" smtClean="0"/>
-              <a:t> and </a:t>
-            </a:r>
-            <a:r>
-              <a:rPr lang="en-CA" dirty="0" err="1" smtClean="0"/>
-              <a:t>UpdateManager</a:t>
-            </a:r>
-            <a:endParaRPr lang="en-CA" dirty="0" smtClean="0"/>
+            <a:endParaRPr lang="en-CA" dirty="0"/>
           </a:p>
           <a:p>
             <a:pPr marL="0" indent="0">
               <a:buNone/>
             </a:pPr>
-            <a:endParaRPr lang="en-CA" dirty="0" smtClean="0"/>
+            <a:endParaRPr lang="en-CA" dirty="0"/>
           </a:p>
           <a:p>
             <a:pPr marL="0" indent="0">
@@ -3838,10 +3784,9 @@
           <a:lstStyle/>
           <a:p>
             <a:r>
-              <a:rPr lang="en-CA" dirty="0" smtClean="0"/>
+              <a:rPr lang="en-CA" dirty="0"/>
               <a:t>The Manifest</a:t>
             </a:r>
-            <a:endParaRPr lang="en-CA" dirty="0"/>
           </a:p>
         </p:txBody>
       </p:sp>
@@ -3897,7 +3842,7 @@
           <a:lstStyle/>
           <a:p>
             <a:r>
-              <a:rPr lang="en-CA" dirty="0" smtClean="0"/>
+              <a:rPr lang="en-CA" dirty="0"/>
               <a:t>An update Manifest is an XML document that consists of a header and one or more deployment items:</a:t>
             </a:r>
           </a:p>
@@ -3906,191 +3851,190 @@
           </a:p>
           <a:p>
             <a:r>
-              <a:rPr lang="en-CA" dirty="0" smtClean="0"/>
+              <a:rPr lang="en-CA" dirty="0"/>
               <a:t>&lt;Manifest</a:t>
             </a:r>
           </a:p>
           <a:p>
             <a:r>
-              <a:rPr lang="en-CA" dirty="0" smtClean="0"/>
+              <a:rPr lang="en-CA" dirty="0"/>
               <a:t>    </a:t>
             </a:r>
             <a:r>
-              <a:rPr lang="en-CA" dirty="0" err="1" smtClean="0"/>
+              <a:rPr lang="en-CA" dirty="0" err="1"/>
               <a:t>LocationGUID</a:t>
             </a:r>
             <a:r>
-              <a:rPr lang="en-CA" dirty="0" smtClean="0"/>
+              <a:rPr lang="en-CA" dirty="0"/>
               <a:t>="{050AEACC-2DA7-4859-BA28-0FE29ACB4BB1}"</a:t>
             </a:r>
           </a:p>
           <a:p>
             <a:r>
-              <a:rPr lang="en-CA" dirty="0" smtClean="0"/>
+              <a:rPr lang="en-CA" dirty="0"/>
               <a:t>    </a:t>
             </a:r>
             <a:r>
-              <a:rPr lang="en-CA" dirty="0" err="1" smtClean="0"/>
+              <a:rPr lang="en-CA" dirty="0" err="1"/>
               <a:t>ApplicationGUID</a:t>
             </a:r>
             <a:r>
-              <a:rPr lang="en-CA" dirty="0" smtClean="0"/>
+              <a:rPr lang="en-CA" dirty="0"/>
               <a:t>="{1FA3579B-269E-4739-92B6-84F03E2500A0}"</a:t>
             </a:r>
           </a:p>
           <a:p>
             <a:r>
-              <a:rPr lang="en-CA" dirty="0" smtClean="0"/>
+              <a:rPr lang="en-CA" dirty="0"/>
               <a:t>    </a:t>
             </a:r>
             <a:r>
-              <a:rPr lang="en-CA" dirty="0" err="1" smtClean="0"/>
+              <a:rPr lang="en-CA" dirty="0" err="1"/>
               <a:t>UpdateVersion</a:t>
             </a:r>
             <a:r>
-              <a:rPr lang="en-CA" dirty="0" smtClean="0"/>
+              <a:rPr lang="en-CA" dirty="0"/>
               <a:t>="5.0.21.2"</a:t>
             </a:r>
           </a:p>
           <a:p>
             <a:r>
-              <a:rPr lang="en-CA" dirty="0" smtClean="0"/>
+              <a:rPr lang="en-CA" dirty="0"/>
               <a:t>    </a:t>
             </a:r>
             <a:r>
-              <a:rPr lang="en-CA" dirty="0" err="1" smtClean="0"/>
+              <a:rPr lang="en-CA" dirty="0" err="1"/>
               <a:t>WhatsNew</a:t>
             </a:r>
             <a:r>
-              <a:rPr lang="en-CA" dirty="0" smtClean="0"/>
+              <a:rPr lang="en-CA" dirty="0"/>
               <a:t>=""</a:t>
             </a:r>
           </a:p>
           <a:p>
             <a:r>
-              <a:rPr lang="en-CA" dirty="0" smtClean="0"/>
+              <a:rPr lang="en-CA" dirty="0"/>
               <a:t>    </a:t>
             </a:r>
             <a:r>
-              <a:rPr lang="en-CA" dirty="0" err="1" smtClean="0"/>
+              <a:rPr lang="en-CA" dirty="0" err="1"/>
               <a:t>IsMandatory</a:t>
             </a:r>
             <a:r>
-              <a:rPr lang="en-CA" dirty="0" smtClean="0"/>
+              <a:rPr lang="en-CA" dirty="0"/>
               <a:t>="false"</a:t>
             </a:r>
           </a:p>
           <a:p>
             <a:r>
-              <a:rPr lang="en-CA" dirty="0" smtClean="0"/>
+              <a:rPr lang="en-CA" dirty="0"/>
               <a:t>    </a:t>
             </a:r>
             <a:r>
-              <a:rPr lang="en-CA" dirty="0" err="1" smtClean="0"/>
+              <a:rPr lang="en-CA" dirty="0" err="1"/>
               <a:t>IsSilent</a:t>
             </a:r>
             <a:r>
-              <a:rPr lang="en-CA" dirty="0" smtClean="0"/>
+              <a:rPr lang="en-CA" dirty="0"/>
               <a:t>="false"</a:t>
             </a:r>
           </a:p>
           <a:p>
             <a:r>
-              <a:rPr lang="en-CA" dirty="0" smtClean="0"/>
+              <a:rPr lang="en-CA" dirty="0"/>
               <a:t>    </a:t>
             </a:r>
             <a:r>
-              <a:rPr lang="en-CA" dirty="0" err="1" smtClean="0"/>
+              <a:rPr lang="en-CA" dirty="0" err="1"/>
               <a:t>IsImmediate</a:t>
             </a:r>
             <a:r>
-              <a:rPr lang="en-CA" dirty="0" smtClean="0"/>
+              <a:rPr lang="en-CA" dirty="0"/>
               <a:t>="false"&gt;</a:t>
             </a:r>
           </a:p>
           <a:p>
-            <a:endParaRPr lang="en-CA" dirty="0" smtClean="0"/>
-          </a:p>
-          <a:p>
-            <a:r>
-              <a:rPr lang="en-CA" dirty="0" smtClean="0"/>
+            <a:endParaRPr lang="en-CA" dirty="0"/>
+          </a:p>
+          <a:p>
+            <a:r>
+              <a:rPr lang="en-CA" dirty="0"/>
               <a:t>    &lt;Item</a:t>
             </a:r>
           </a:p>
           <a:p>
             <a:r>
-              <a:rPr lang="en-CA" dirty="0" smtClean="0"/>
+              <a:rPr lang="en-CA" dirty="0"/>
               <a:t>        </a:t>
             </a:r>
             <a:r>
-              <a:rPr lang="en-CA" dirty="0" err="1" smtClean="0"/>
+              <a:rPr lang="en-CA" dirty="0" err="1"/>
               <a:t>FileName</a:t>
             </a:r>
             <a:r>
-              <a:rPr lang="en-CA" dirty="0" smtClean="0"/>
-              <a:t>="CAT.ZIP"</a:t>
-            </a:r>
-          </a:p>
-          <a:p>
-            <a:r>
-              <a:rPr lang="en-CA" dirty="0" smtClean="0"/>
+              <a:rPr lang="en-CA" dirty="0"/>
+              <a:t>=“MyApp.ZIP"</a:t>
+            </a:r>
+          </a:p>
+          <a:p>
+            <a:r>
+              <a:rPr lang="en-CA" dirty="0"/>
               <a:t>        </a:t>
             </a:r>
             <a:r>
-              <a:rPr lang="en-CA" dirty="0" err="1" smtClean="0"/>
+              <a:rPr lang="en-CA" dirty="0" err="1"/>
               <a:t>IsAPatch</a:t>
             </a:r>
             <a:r>
-              <a:rPr lang="en-CA" dirty="0" smtClean="0"/>
+              <a:rPr lang="en-CA" dirty="0"/>
               <a:t>="false"</a:t>
             </a:r>
           </a:p>
           <a:p>
             <a:r>
-              <a:rPr lang="en-CA" dirty="0" smtClean="0"/>
+              <a:rPr lang="en-CA" dirty="0"/>
               <a:t>        </a:t>
             </a:r>
             <a:r>
-              <a:rPr lang="en-CA" dirty="0" err="1" smtClean="0"/>
+              <a:rPr lang="en-CA" dirty="0" err="1"/>
               <a:t>IsAZip</a:t>
             </a:r>
             <a:r>
-              <a:rPr lang="en-CA" dirty="0" smtClean="0"/>
+              <a:rPr lang="en-CA" dirty="0"/>
               <a:t>="true"</a:t>
             </a:r>
           </a:p>
           <a:p>
             <a:r>
-              <a:rPr lang="en-CA" dirty="0" smtClean="0"/>
+              <a:rPr lang="en-CA" dirty="0"/>
               <a:t>        Launch="false"</a:t>
             </a:r>
           </a:p>
           <a:p>
             <a:r>
-              <a:rPr lang="en-CA" dirty="0" smtClean="0"/>
+              <a:rPr lang="en-CA" dirty="0"/>
               <a:t>        Version="5.0.20.49999"</a:t>
             </a:r>
           </a:p>
           <a:p>
             <a:r>
-              <a:rPr lang="en-CA" dirty="0" smtClean="0"/>
+              <a:rPr lang="en-CA" dirty="0"/>
               <a:t>        </a:t>
             </a:r>
             <a:r>
-              <a:rPr lang="en-CA" dirty="0" err="1" smtClean="0"/>
+              <a:rPr lang="en-CA" dirty="0" err="1"/>
               <a:t>TargetPath</a:t>
             </a:r>
             <a:r>
-              <a:rPr lang="en-CA" dirty="0" smtClean="0"/>
+              <a:rPr lang="en-CA" dirty="0"/>
               <a:t>="{app}"/&gt;</a:t>
             </a:r>
           </a:p>
           <a:p>
             <a:r>
-              <a:rPr lang="en-CA" dirty="0" smtClean="0"/>
+              <a:rPr lang="en-CA" dirty="0"/>
               <a:t>&lt;/Manifest&gt;</a:t>
             </a:r>
-            <a:endParaRPr lang="en-CA" dirty="0"/>
           </a:p>
         </p:txBody>
       </p:sp>
@@ -4140,10 +4084,9 @@
           <a:lstStyle/>
           <a:p>
             <a:r>
-              <a:rPr lang="en-CA" dirty="0" smtClean="0"/>
+              <a:rPr lang="en-CA" dirty="0"/>
               <a:t>DEMO</a:t>
             </a:r>
-            <a:endParaRPr lang="en-CA" dirty="0"/>
           </a:p>
         </p:txBody>
       </p:sp>

</xml_diff>